<commit_message>
update document and README
</commit_message>
<xml_diff>
--- a/doc/image_compressor.pptx
+++ b/doc/image_compressor.pptx
@@ -6,6 +6,7 @@
   </p:sldMasterIdLst>
   <p:sldIdLst>
     <p:sldId id="256" r:id="rId2"/>
+    <p:sldId id="257" r:id="rId3"/>
   </p:sldIdLst>
   <p:sldSz cx="9144000" cy="6858000" type="screen4x3"/>
   <p:notesSz cx="6858000" cy="9144000"/>
@@ -243,7 +244,7 @@
           <a:p>
             <a:fld id="{4E016455-A17B-40E5-9EF1-35ACA378BF78}" type="datetimeFigureOut">
               <a:rPr lang="en-US" smtClean="0"/>
-              <a:t>3/28/2021</a:t>
+              <a:t>3/29/2021</a:t>
             </a:fld>
             <a:endParaRPr lang="en-US"/>
           </a:p>
@@ -413,7 +414,7 @@
           <a:p>
             <a:fld id="{4E016455-A17B-40E5-9EF1-35ACA378BF78}" type="datetimeFigureOut">
               <a:rPr lang="en-US" smtClean="0"/>
-              <a:t>3/28/2021</a:t>
+              <a:t>3/29/2021</a:t>
             </a:fld>
             <a:endParaRPr lang="en-US"/>
           </a:p>
@@ -593,7 +594,7 @@
           <a:p>
             <a:fld id="{4E016455-A17B-40E5-9EF1-35ACA378BF78}" type="datetimeFigureOut">
               <a:rPr lang="en-US" smtClean="0"/>
-              <a:t>3/28/2021</a:t>
+              <a:t>3/29/2021</a:t>
             </a:fld>
             <a:endParaRPr lang="en-US"/>
           </a:p>
@@ -763,7 +764,7 @@
           <a:p>
             <a:fld id="{4E016455-A17B-40E5-9EF1-35ACA378BF78}" type="datetimeFigureOut">
               <a:rPr lang="en-US" smtClean="0"/>
-              <a:t>3/28/2021</a:t>
+              <a:t>3/29/2021</a:t>
             </a:fld>
             <a:endParaRPr lang="en-US"/>
           </a:p>
@@ -1007,7 +1008,7 @@
           <a:p>
             <a:fld id="{4E016455-A17B-40E5-9EF1-35ACA378BF78}" type="datetimeFigureOut">
               <a:rPr lang="en-US" smtClean="0"/>
-              <a:t>3/28/2021</a:t>
+              <a:t>3/29/2021</a:t>
             </a:fld>
             <a:endParaRPr lang="en-US"/>
           </a:p>
@@ -1239,7 +1240,7 @@
           <a:p>
             <a:fld id="{4E016455-A17B-40E5-9EF1-35ACA378BF78}" type="datetimeFigureOut">
               <a:rPr lang="en-US" smtClean="0"/>
-              <a:t>3/28/2021</a:t>
+              <a:t>3/29/2021</a:t>
             </a:fld>
             <a:endParaRPr lang="en-US"/>
           </a:p>
@@ -1606,7 +1607,7 @@
           <a:p>
             <a:fld id="{4E016455-A17B-40E5-9EF1-35ACA378BF78}" type="datetimeFigureOut">
               <a:rPr lang="en-US" smtClean="0"/>
-              <a:t>3/28/2021</a:t>
+              <a:t>3/29/2021</a:t>
             </a:fld>
             <a:endParaRPr lang="en-US"/>
           </a:p>
@@ -1724,7 +1725,7 @@
           <a:p>
             <a:fld id="{4E016455-A17B-40E5-9EF1-35ACA378BF78}" type="datetimeFigureOut">
               <a:rPr lang="en-US" smtClean="0"/>
-              <a:t>3/28/2021</a:t>
+              <a:t>3/29/2021</a:t>
             </a:fld>
             <a:endParaRPr lang="en-US"/>
           </a:p>
@@ -1819,7 +1820,7 @@
           <a:p>
             <a:fld id="{4E016455-A17B-40E5-9EF1-35ACA378BF78}" type="datetimeFigureOut">
               <a:rPr lang="en-US" smtClean="0"/>
-              <a:t>3/28/2021</a:t>
+              <a:t>3/29/2021</a:t>
             </a:fld>
             <a:endParaRPr lang="en-US"/>
           </a:p>
@@ -2096,7 +2097,7 @@
           <a:p>
             <a:fld id="{4E016455-A17B-40E5-9EF1-35ACA378BF78}" type="datetimeFigureOut">
               <a:rPr lang="en-US" smtClean="0"/>
-              <a:t>3/28/2021</a:t>
+              <a:t>3/29/2021</a:t>
             </a:fld>
             <a:endParaRPr lang="en-US"/>
           </a:p>
@@ -2353,7 +2354,7 @@
           <a:p>
             <a:fld id="{4E016455-A17B-40E5-9EF1-35ACA378BF78}" type="datetimeFigureOut">
               <a:rPr lang="en-US" smtClean="0"/>
-              <a:t>3/28/2021</a:t>
+              <a:t>3/29/2021</a:t>
             </a:fld>
             <a:endParaRPr lang="en-US"/>
           </a:p>
@@ -2566,7 +2567,7 @@
           <a:p>
             <a:fld id="{4E016455-A17B-40E5-9EF1-35ACA378BF78}" type="datetimeFigureOut">
               <a:rPr lang="en-US" smtClean="0"/>
-              <a:t>3/28/2021</a:t>
+              <a:t>3/29/2021</a:t>
             </a:fld>
             <a:endParaRPr lang="en-US"/>
           </a:p>
@@ -3490,6 +3491,190 @@
 </p:sld>
 </file>
 
+<file path=ppt/slides/slide2.xml><?xml version="1.0" encoding="utf-8"?>
+<p:sld xmlns:a="http://schemas.openxmlformats.org/drawingml/2006/main" xmlns:r="http://schemas.openxmlformats.org/officeDocument/2006/relationships" xmlns:p="http://schemas.openxmlformats.org/presentationml/2006/main">
+  <p:cSld>
+    <p:spTree>
+      <p:nvGrpSpPr>
+        <p:cNvPr id="1" name=""/>
+        <p:cNvGrpSpPr/>
+        <p:nvPr/>
+      </p:nvGrpSpPr>
+      <p:grpSpPr>
+        <a:xfrm>
+          <a:off x="0" y="0"/>
+          <a:ext cx="0" cy="0"/>
+          <a:chOff x="0" y="0"/>
+          <a:chExt cx="0" cy="0"/>
+        </a:xfrm>
+      </p:grpSpPr>
+      <p:pic>
+        <p:nvPicPr>
+          <p:cNvPr id="2" name="Picture 1"/>
+          <p:cNvPicPr>
+            <a:picLocks noChangeAspect="1"/>
+          </p:cNvPicPr>
+          <p:nvPr/>
+        </p:nvPicPr>
+        <p:blipFill>
+          <a:blip r:embed="rId2" cstate="print">
+            <a:extLst>
+              <a:ext uri="{28A0092B-C50C-407E-A947-70E740481C1C}">
+                <a14:useLocalDpi xmlns:a14="http://schemas.microsoft.com/office/drawing/2010/main" val="0"/>
+              </a:ext>
+            </a:extLst>
+          </a:blip>
+          <a:stretch>
+            <a:fillRect/>
+          </a:stretch>
+        </p:blipFill>
+        <p:spPr>
+          <a:xfrm>
+            <a:off x="345280" y="3518737"/>
+            <a:ext cx="5240748" cy="3017520"/>
+          </a:xfrm>
+          <a:prstGeom prst="rect">
+            <a:avLst/>
+          </a:prstGeom>
+        </p:spPr>
+      </p:pic>
+      <p:pic>
+        <p:nvPicPr>
+          <p:cNvPr id="3" name="Picture 2"/>
+          <p:cNvPicPr>
+            <a:picLocks noChangeAspect="1"/>
+          </p:cNvPicPr>
+          <p:nvPr/>
+        </p:nvPicPr>
+        <p:blipFill>
+          <a:blip r:embed="rId3">
+            <a:extLst>
+              <a:ext uri="{28A0092B-C50C-407E-A947-70E740481C1C}">
+                <a14:useLocalDpi xmlns:a14="http://schemas.microsoft.com/office/drawing/2010/main" val="0"/>
+              </a:ext>
+            </a:extLst>
+          </a:blip>
+          <a:stretch>
+            <a:fillRect/>
+          </a:stretch>
+        </p:blipFill>
+        <p:spPr>
+          <a:xfrm>
+            <a:off x="2965654" y="309490"/>
+            <a:ext cx="6052766" cy="3017520"/>
+          </a:xfrm>
+          <a:prstGeom prst="rect">
+            <a:avLst/>
+          </a:prstGeom>
+          <a:ln>
+            <a:solidFill>
+              <a:schemeClr val="tx1"/>
+            </a:solidFill>
+          </a:ln>
+        </p:spPr>
+      </p:pic>
+      <p:sp>
+        <p:nvSpPr>
+          <p:cNvPr id="4" name="TextBox 3"/>
+          <p:cNvSpPr txBox="1"/>
+          <p:nvPr/>
+        </p:nvSpPr>
+        <p:spPr>
+          <a:xfrm>
+            <a:off x="345280" y="1633584"/>
+            <a:ext cx="2552365" cy="369332"/>
+          </a:xfrm>
+          <a:prstGeom prst="rect">
+            <a:avLst/>
+          </a:prstGeom>
+          <a:noFill/>
+        </p:spPr>
+        <p:txBody>
+          <a:bodyPr wrap="none" rtlCol="0">
+            <a:spAutoFit/>
+          </a:bodyPr>
+          <a:lstStyle/>
+          <a:p>
+            <a:pPr algn="ctr"/>
+            <a:r>
+              <a:rPr lang="en-US" dirty="0" smtClean="0"/>
+              <a:t>The MSE and PSNR graph</a:t>
+            </a:r>
+            <a:endParaRPr lang="en-US" dirty="0"/>
+          </a:p>
+        </p:txBody>
+      </p:sp>
+      <p:sp>
+        <p:nvSpPr>
+          <p:cNvPr id="5" name="TextBox 4"/>
+          <p:cNvSpPr txBox="1"/>
+          <p:nvPr/>
+        </p:nvSpPr>
+        <p:spPr>
+          <a:xfrm>
+            <a:off x="5992037" y="4842831"/>
+            <a:ext cx="2179828" cy="369332"/>
+          </a:xfrm>
+          <a:prstGeom prst="rect">
+            <a:avLst/>
+          </a:prstGeom>
+          <a:noFill/>
+        </p:spPr>
+        <p:txBody>
+          <a:bodyPr wrap="none" rtlCol="0">
+            <a:spAutoFit/>
+          </a:bodyPr>
+          <a:lstStyle/>
+          <a:p>
+            <a:pPr algn="ctr"/>
+            <a:r>
+              <a:rPr lang="en-US" dirty="0" smtClean="0">
+                <a:latin typeface="Calibri" panose="020F0502020204030204" pitchFamily="34" charset="0"/>
+                <a:cs typeface="Calibri" panose="020F0502020204030204" pitchFamily="34" charset="0"/>
+              </a:rPr>
+              <a:t>Our</a:t>
+            </a:r>
+            <a:r>
+              <a:rPr lang="vi-VN" dirty="0" smtClean="0">
+                <a:latin typeface="Calibri" panose="020F0502020204030204" pitchFamily="34" charset="0"/>
+                <a:cs typeface="Calibri" panose="020F0502020204030204" pitchFamily="34" charset="0"/>
+              </a:rPr>
+              <a:t> display interface</a:t>
+            </a:r>
+            <a:r>
+              <a:rPr lang="en-US" dirty="0" smtClean="0">
+                <a:latin typeface="Calibri" panose="020F0502020204030204" pitchFamily="34" charset="0"/>
+                <a:cs typeface="Calibri" panose="020F0502020204030204" pitchFamily="34" charset="0"/>
+              </a:rPr>
+              <a:t> </a:t>
+            </a:r>
+            <a:endParaRPr lang="en-US" dirty="0">
+              <a:latin typeface="Calibri" panose="020F0502020204030204" pitchFamily="34" charset="0"/>
+              <a:cs typeface="Calibri" panose="020F0502020204030204" pitchFamily="34" charset="0"/>
+            </a:endParaRPr>
+          </a:p>
+        </p:txBody>
+      </p:sp>
+    </p:spTree>
+    <p:extLst>
+      <p:ext uri="{BB962C8B-B14F-4D97-AF65-F5344CB8AC3E}">
+        <p14:creationId xmlns:p14="http://schemas.microsoft.com/office/powerpoint/2010/main" val="339457292"/>
+      </p:ext>
+    </p:extLst>
+  </p:cSld>
+  <p:clrMapOvr>
+    <a:masterClrMapping/>
+  </p:clrMapOvr>
+  <p:timing>
+    <p:tnLst>
+      <p:par>
+        <p:cTn id="1" dur="indefinite" restart="never" nodeType="tmRoot"/>
+      </p:par>
+    </p:tnLst>
+  </p:timing>
+</p:sld>
+</file>
+
 <file path=ppt/theme/theme1.xml><?xml version="1.0" encoding="utf-8"?>
 <a:theme xmlns:a="http://schemas.openxmlformats.org/drawingml/2006/main" name="Office Theme">
   <a:themeElements>

</xml_diff>